<commit_message>
Added lab 5 locations
</commit_message>
<xml_diff>
--- a/android.pptx
+++ b/android.pptx
@@ -47,7 +47,10 @@
     <p:sldId id="292" r:id="rId41"/>
     <p:sldId id="296" r:id="rId42"/>
     <p:sldId id="297" r:id="rId43"/>
-    <p:sldId id="298" r:id="rId44"/>
+    <p:sldId id="299" r:id="rId44"/>
+    <p:sldId id="300" r:id="rId45"/>
+    <p:sldId id="301" r:id="rId46"/>
+    <p:sldId id="298" r:id="rId47"/>
   </p:sldIdLst>
   <p:sldSz cx="9144000" cy="6858000" type="screen4x3"/>
   <p:notesSz cx="6858000" cy="9144000"/>
@@ -330,7 +333,7 @@
           <a:p>
             <a:fld id="{6E019F36-BB36-5640-A629-8C31A03F64E5}" type="datetimeFigureOut">
               <a:rPr lang="en-US" smtClean="0"/>
-              <a:t>1/25/12</a:t>
+              <a:t>1/26/12</a:t>
             </a:fld>
             <a:endParaRPr lang="en-US"/>
           </a:p>
@@ -500,7 +503,7 @@
           <a:p>
             <a:fld id="{6E019F36-BB36-5640-A629-8C31A03F64E5}" type="datetimeFigureOut">
               <a:rPr lang="en-US" smtClean="0"/>
-              <a:t>1/25/12</a:t>
+              <a:t>1/26/12</a:t>
             </a:fld>
             <a:endParaRPr lang="en-US"/>
           </a:p>
@@ -680,7 +683,7 @@
           <a:p>
             <a:fld id="{6E019F36-BB36-5640-A629-8C31A03F64E5}" type="datetimeFigureOut">
               <a:rPr lang="en-US" smtClean="0"/>
-              <a:t>1/25/12</a:t>
+              <a:t>1/26/12</a:t>
             </a:fld>
             <a:endParaRPr lang="en-US"/>
           </a:p>
@@ -850,7 +853,7 @@
           <a:p>
             <a:fld id="{6E019F36-BB36-5640-A629-8C31A03F64E5}" type="datetimeFigureOut">
               <a:rPr lang="en-US" smtClean="0"/>
-              <a:t>1/25/12</a:t>
+              <a:t>1/26/12</a:t>
             </a:fld>
             <a:endParaRPr lang="en-US"/>
           </a:p>
@@ -1096,7 +1099,7 @@
           <a:p>
             <a:fld id="{6E019F36-BB36-5640-A629-8C31A03F64E5}" type="datetimeFigureOut">
               <a:rPr lang="en-US" smtClean="0"/>
-              <a:t>1/25/12</a:t>
+              <a:t>1/26/12</a:t>
             </a:fld>
             <a:endParaRPr lang="en-US"/>
           </a:p>
@@ -1384,7 +1387,7 @@
           <a:p>
             <a:fld id="{6E019F36-BB36-5640-A629-8C31A03F64E5}" type="datetimeFigureOut">
               <a:rPr lang="en-US" smtClean="0"/>
-              <a:t>1/25/12</a:t>
+              <a:t>1/26/12</a:t>
             </a:fld>
             <a:endParaRPr lang="en-US"/>
           </a:p>
@@ -1806,7 +1809,7 @@
           <a:p>
             <a:fld id="{6E019F36-BB36-5640-A629-8C31A03F64E5}" type="datetimeFigureOut">
               <a:rPr lang="en-US" smtClean="0"/>
-              <a:t>1/25/12</a:t>
+              <a:t>1/26/12</a:t>
             </a:fld>
             <a:endParaRPr lang="en-US"/>
           </a:p>
@@ -1924,7 +1927,7 @@
           <a:p>
             <a:fld id="{6E019F36-BB36-5640-A629-8C31A03F64E5}" type="datetimeFigureOut">
               <a:rPr lang="en-US" smtClean="0"/>
-              <a:t>1/25/12</a:t>
+              <a:t>1/26/12</a:t>
             </a:fld>
             <a:endParaRPr lang="en-US"/>
           </a:p>
@@ -2019,7 +2022,7 @@
           <a:p>
             <a:fld id="{6E019F36-BB36-5640-A629-8C31A03F64E5}" type="datetimeFigureOut">
               <a:rPr lang="en-US" smtClean="0"/>
-              <a:t>1/25/12</a:t>
+              <a:t>1/26/12</a:t>
             </a:fld>
             <a:endParaRPr lang="en-US"/>
           </a:p>
@@ -2296,7 +2299,7 @@
           <a:p>
             <a:fld id="{6E019F36-BB36-5640-A629-8C31A03F64E5}" type="datetimeFigureOut">
               <a:rPr lang="en-US" smtClean="0"/>
-              <a:t>1/25/12</a:t>
+              <a:t>1/26/12</a:t>
             </a:fld>
             <a:endParaRPr lang="en-US"/>
           </a:p>
@@ -2549,7 +2552,7 @@
           <a:p>
             <a:fld id="{6E019F36-BB36-5640-A629-8C31A03F64E5}" type="datetimeFigureOut">
               <a:rPr lang="en-US" smtClean="0"/>
-              <a:t>1/25/12</a:t>
+              <a:t>1/26/12</a:t>
             </a:fld>
             <a:endParaRPr lang="en-US"/>
           </a:p>
@@ -2762,7 +2765,7 @@
           <a:p>
             <a:fld id="{6E019F36-BB36-5640-A629-8C31A03F64E5}" type="datetimeFigureOut">
               <a:rPr lang="en-US" smtClean="0"/>
-              <a:t>1/25/12</a:t>
+              <a:t>1/26/12</a:t>
             </a:fld>
             <a:endParaRPr lang="en-US"/>
           </a:p>
@@ -8723,7 +8726,25 @@
           <a:bodyPr/>
           <a:lstStyle/>
           <a:p>
-            <a:endParaRPr lang="en-US"/>
+            <a:r>
+              <a:rPr lang="en-US" dirty="0" err="1" smtClean="0"/>
+              <a:t>MapView</a:t>
+            </a:r>
+            <a:endParaRPr lang="en-US" dirty="0" smtClean="0"/>
+          </a:p>
+          <a:p>
+            <a:r>
+              <a:rPr lang="en-US" dirty="0" err="1" smtClean="0"/>
+              <a:t>MapActivity</a:t>
+            </a:r>
+            <a:endParaRPr lang="en-US" dirty="0" smtClean="0"/>
+          </a:p>
+          <a:p>
+            <a:r>
+              <a:rPr lang="en-US" dirty="0" err="1" smtClean="0"/>
+              <a:t>Geocoder</a:t>
+            </a:r>
+            <a:endParaRPr lang="en-US" dirty="0"/>
           </a:p>
         </p:txBody>
       </p:sp>
@@ -8774,31 +8795,447 @@
           <a:p>
             <a:r>
               <a:rPr lang="en-US" dirty="0" smtClean="0"/>
+              <a:t>Get API Key</a:t>
+            </a:r>
+            <a:endParaRPr lang="en-US" dirty="0"/>
+          </a:p>
+        </p:txBody>
+      </p:sp>
+      <p:sp>
+        <p:nvSpPr>
+          <p:cNvPr id="3" name="Content Placeholder 2"/>
+          <p:cNvSpPr>
+            <a:spLocks noGrp="1"/>
+          </p:cNvSpPr>
+          <p:nvPr>
+            <p:ph idx="1"/>
+          </p:nvPr>
+        </p:nvSpPr>
+        <p:spPr/>
+        <p:txBody>
+          <a:bodyPr>
+            <a:normAutofit lnSpcReduction="10000"/>
+          </a:bodyPr>
+          <a:lstStyle/>
+          <a:p>
+            <a:pPr marL="0" indent="0">
+              <a:buNone/>
+            </a:pPr>
+            <a:r>
+              <a:rPr lang="en-US" sz="2800" dirty="0">
+                <a:cs typeface="Lucida Console"/>
+                <a:hlinkClick r:id="rId2"/>
+              </a:rPr>
+              <a:t>http://code.google.com/android/maps-api-</a:t>
+            </a:r>
+            <a:r>
+              <a:rPr lang="en-US" sz="2800" dirty="0" smtClean="0">
+                <a:cs typeface="Lucida Console"/>
+                <a:hlinkClick r:id="rId2"/>
+              </a:rPr>
+              <a:t>signup.html</a:t>
+            </a:r>
+            <a:endParaRPr lang="en-US" sz="2800" dirty="0" smtClean="0">
+              <a:cs typeface="Lucida Console"/>
+            </a:endParaRPr>
+          </a:p>
+          <a:p>
+            <a:pPr marL="0" indent="0">
+              <a:buNone/>
+            </a:pPr>
+            <a:endParaRPr lang="en-US" sz="2400" dirty="0">
+              <a:cs typeface="Lucida Console"/>
+            </a:endParaRPr>
+          </a:p>
+          <a:p>
+            <a:pPr marL="0" indent="0">
+              <a:buNone/>
+            </a:pPr>
+            <a:r>
+              <a:rPr lang="en-US" sz="2400" dirty="0" err="1" smtClean="0">
+                <a:latin typeface="Lucida Console"/>
+                <a:cs typeface="Lucida Console"/>
+              </a:rPr>
+              <a:t>keytool</a:t>
+            </a:r>
+            <a:r>
+              <a:rPr lang="en-US" sz="2400" dirty="0" smtClean="0">
+                <a:latin typeface="Lucida Console"/>
+                <a:cs typeface="Lucida Console"/>
+              </a:rPr>
+              <a:t> </a:t>
+            </a:r>
+            <a:r>
+              <a:rPr lang="en-US" sz="2400" dirty="0">
+                <a:latin typeface="Lucida Console"/>
+                <a:cs typeface="Lucida Console"/>
+              </a:rPr>
+              <a:t>-list -alias </a:t>
+            </a:r>
+            <a:r>
+              <a:rPr lang="en-US" sz="2400" dirty="0" err="1">
+                <a:latin typeface="Lucida Console"/>
+                <a:cs typeface="Lucida Console"/>
+              </a:rPr>
+              <a:t>androiddebugkey</a:t>
+            </a:r>
+            <a:r>
+              <a:rPr lang="en-US" sz="2400" dirty="0">
+                <a:latin typeface="Lucida Console"/>
+                <a:cs typeface="Lucida Console"/>
+              </a:rPr>
+              <a:t> -</a:t>
+            </a:r>
+            <a:r>
+              <a:rPr lang="en-US" sz="2400" dirty="0" err="1">
+                <a:latin typeface="Lucida Console"/>
+                <a:cs typeface="Lucida Console"/>
+              </a:rPr>
+              <a:t>keystore</a:t>
+            </a:r>
+            <a:r>
+              <a:rPr lang="en-US" sz="2400" dirty="0">
+                <a:latin typeface="Lucida Console"/>
+                <a:cs typeface="Lucida Console"/>
+              </a:rPr>
+              <a:t> </a:t>
+            </a:r>
+            <a:r>
+              <a:rPr lang="en-US" sz="2400" dirty="0" smtClean="0">
+                <a:latin typeface="Lucida Console"/>
+                <a:cs typeface="Lucida Console"/>
+              </a:rPr>
+              <a:t>”/full/path/</a:t>
+            </a:r>
+            <a:r>
+              <a:rPr lang="en-US" sz="2400" dirty="0">
+                <a:latin typeface="Lucida Console"/>
+                <a:cs typeface="Lucida Console"/>
+              </a:rPr>
+              <a:t>learn-android/</a:t>
+            </a:r>
+            <a:r>
+              <a:rPr lang="en-US" sz="2400" dirty="0" err="1">
+                <a:latin typeface="Lucida Console"/>
+                <a:cs typeface="Lucida Console"/>
+              </a:rPr>
+              <a:t>debug.keystore</a:t>
+            </a:r>
+            <a:r>
+              <a:rPr lang="en-US" sz="2400" dirty="0">
+                <a:latin typeface="Lucida Console"/>
+                <a:cs typeface="Lucida Console"/>
+              </a:rPr>
+              <a:t>" -</a:t>
+            </a:r>
+            <a:r>
+              <a:rPr lang="en-US" sz="2400" dirty="0" err="1">
+                <a:latin typeface="Lucida Console"/>
+                <a:cs typeface="Lucida Console"/>
+              </a:rPr>
+              <a:t>storepass</a:t>
+            </a:r>
+            <a:r>
+              <a:rPr lang="en-US" sz="2400" dirty="0">
+                <a:latin typeface="Lucida Console"/>
+                <a:cs typeface="Lucida Console"/>
+              </a:rPr>
+              <a:t> android -</a:t>
+            </a:r>
+            <a:r>
+              <a:rPr lang="en-US" sz="2400" dirty="0" err="1">
+                <a:latin typeface="Lucida Console"/>
+                <a:cs typeface="Lucida Console"/>
+              </a:rPr>
+              <a:t>keypass</a:t>
+            </a:r>
+            <a:r>
+              <a:rPr lang="en-US" sz="2400" dirty="0">
+                <a:latin typeface="Lucida Console"/>
+                <a:cs typeface="Lucida Console"/>
+              </a:rPr>
+              <a:t> </a:t>
+            </a:r>
+            <a:r>
+              <a:rPr lang="en-US" sz="2400" dirty="0" smtClean="0">
+                <a:latin typeface="Lucida Console"/>
+                <a:cs typeface="Lucida Console"/>
+              </a:rPr>
+              <a:t>android</a:t>
+            </a:r>
+          </a:p>
+          <a:p>
+            <a:pPr marL="0" indent="0">
+              <a:buNone/>
+            </a:pPr>
+            <a:endParaRPr lang="en-US" sz="2400" dirty="0">
+              <a:latin typeface="Lucida Console"/>
+              <a:cs typeface="Lucida Console"/>
+            </a:endParaRPr>
+          </a:p>
+          <a:p>
+            <a:pPr marL="0" indent="0">
+              <a:buNone/>
+            </a:pPr>
+            <a:r>
+              <a:rPr lang="en-US" sz="2400" dirty="0" err="1">
+                <a:latin typeface="Lucida Console"/>
+                <a:cs typeface="Lucida Console"/>
+              </a:rPr>
+              <a:t>androiddebugkey</a:t>
+            </a:r>
+            <a:r>
+              <a:rPr lang="en-US" sz="2400" dirty="0">
+                <a:latin typeface="Lucida Console"/>
+                <a:cs typeface="Lucida Console"/>
+              </a:rPr>
+              <a:t>, Sep 4, 2011, </a:t>
+            </a:r>
+            <a:r>
+              <a:rPr lang="en-US" sz="2400" dirty="0" err="1">
+                <a:latin typeface="Lucida Console"/>
+                <a:cs typeface="Lucida Console"/>
+              </a:rPr>
+              <a:t>PrivateKeyEntry</a:t>
+            </a:r>
+            <a:r>
+              <a:rPr lang="en-US" sz="2400" dirty="0">
+                <a:latin typeface="Lucida Console"/>
+                <a:cs typeface="Lucida Console"/>
+              </a:rPr>
+              <a:t>, </a:t>
+            </a:r>
+          </a:p>
+          <a:p>
+            <a:pPr marL="0" indent="0">
+              <a:buNone/>
+            </a:pPr>
+            <a:r>
+              <a:rPr lang="en-US" sz="2400" dirty="0">
+                <a:latin typeface="Lucida Console"/>
+                <a:cs typeface="Lucida Console"/>
+              </a:rPr>
+              <a:t>Certificate fingerprint (MD5): 70:3C:3D:A9:52:2B:73:9E:E1:81:B4:DD:B9:5B:F6:F8</a:t>
+            </a:r>
+          </a:p>
+        </p:txBody>
+      </p:sp>
+    </p:spTree>
+    <p:extLst>
+      <p:ext uri="{BB962C8B-B14F-4D97-AF65-F5344CB8AC3E}">
+        <p14:creationId xmlns:p14="http://schemas.microsoft.com/office/powerpoint/2010/main" val="381961892"/>
+      </p:ext>
+    </p:extLst>
+  </p:cSld>
+  <p:clrMapOvr>
+    <a:masterClrMapping/>
+  </p:clrMapOvr>
+</p:sld>
+</file>
+
+<file path=ppt/slides/slide44.xml><?xml version="1.0" encoding="utf-8"?>
+<p:sld xmlns:a="http://schemas.openxmlformats.org/drawingml/2006/main" xmlns:r="http://schemas.openxmlformats.org/officeDocument/2006/relationships" xmlns:p="http://schemas.openxmlformats.org/presentationml/2006/main">
+  <p:cSld>
+    <p:spTree>
+      <p:nvGrpSpPr>
+        <p:cNvPr id="1" name=""/>
+        <p:cNvGrpSpPr/>
+        <p:nvPr/>
+      </p:nvGrpSpPr>
+      <p:grpSpPr>
+        <a:xfrm>
+          <a:off x="0" y="0"/>
+          <a:ext cx="0" cy="0"/>
+          <a:chOff x="0" y="0"/>
+          <a:chExt cx="0" cy="0"/>
+        </a:xfrm>
+      </p:grpSpPr>
+      <p:sp>
+        <p:nvSpPr>
+          <p:cNvPr id="2" name="Title 1"/>
+          <p:cNvSpPr>
+            <a:spLocks noGrp="1"/>
+          </p:cNvSpPr>
+          <p:nvPr>
+            <p:ph type="title"/>
+          </p:nvPr>
+        </p:nvSpPr>
+        <p:spPr/>
+        <p:txBody>
+          <a:bodyPr/>
+          <a:lstStyle/>
+          <a:p>
+            <a:r>
+              <a:rPr lang="en-US" dirty="0" smtClean="0"/>
+              <a:t>Install APIs</a:t>
+            </a:r>
+            <a:endParaRPr lang="en-US" dirty="0"/>
+          </a:p>
+        </p:txBody>
+      </p:sp>
+      <p:pic>
+        <p:nvPicPr>
+          <p:cNvPr id="5" name="Content Placeholder 4"/>
+          <p:cNvPicPr>
+            <a:picLocks noGrp="1" noChangeAspect="1"/>
+          </p:cNvPicPr>
+          <p:nvPr>
+            <p:ph idx="1"/>
+          </p:nvPr>
+        </p:nvPicPr>
+        <p:blipFill>
+          <a:blip r:embed="rId2"/>
+          <a:srcRect l="-7950" r="-7950"/>
+          <a:stretch>
+            <a:fillRect/>
+          </a:stretch>
+        </p:blipFill>
+        <p:spPr/>
+      </p:pic>
+    </p:spTree>
+    <p:extLst>
+      <p:ext uri="{BB962C8B-B14F-4D97-AF65-F5344CB8AC3E}">
+        <p14:creationId xmlns:p14="http://schemas.microsoft.com/office/powerpoint/2010/main" val="1979800442"/>
+      </p:ext>
+    </p:extLst>
+  </p:cSld>
+  <p:clrMapOvr>
+    <a:masterClrMapping/>
+  </p:clrMapOvr>
+</p:sld>
+</file>
+
+<file path=ppt/slides/slide45.xml><?xml version="1.0" encoding="utf-8"?>
+<p:sld xmlns:a="http://schemas.openxmlformats.org/drawingml/2006/main" xmlns:r="http://schemas.openxmlformats.org/officeDocument/2006/relationships" xmlns:p="http://schemas.openxmlformats.org/presentationml/2006/main">
+  <p:cSld>
+    <p:spTree>
+      <p:nvGrpSpPr>
+        <p:cNvPr id="1" name=""/>
+        <p:cNvGrpSpPr/>
+        <p:nvPr/>
+      </p:nvGrpSpPr>
+      <p:grpSpPr>
+        <a:xfrm>
+          <a:off x="0" y="0"/>
+          <a:ext cx="0" cy="0"/>
+          <a:chOff x="0" y="0"/>
+          <a:chExt cx="0" cy="0"/>
+        </a:xfrm>
+      </p:grpSpPr>
+      <p:sp>
+        <p:nvSpPr>
+          <p:cNvPr id="2" name="Title 1"/>
+          <p:cNvSpPr>
+            <a:spLocks noGrp="1"/>
+          </p:cNvSpPr>
+          <p:nvPr>
+            <p:ph type="title"/>
+          </p:nvPr>
+        </p:nvSpPr>
+        <p:spPr/>
+        <p:txBody>
+          <a:bodyPr/>
+          <a:lstStyle/>
+          <a:p>
+            <a:r>
+              <a:rPr lang="en-US" dirty="0" smtClean="0"/>
+              <a:t>Change Build Target</a:t>
+            </a:r>
+            <a:endParaRPr lang="en-US" dirty="0"/>
+          </a:p>
+        </p:txBody>
+      </p:sp>
+      <p:pic>
+        <p:nvPicPr>
+          <p:cNvPr id="4" name="Content Placeholder 3"/>
+          <p:cNvPicPr>
+            <a:picLocks noGrp="1" noChangeAspect="1"/>
+          </p:cNvPicPr>
+          <p:nvPr>
+            <p:ph idx="1"/>
+          </p:nvPr>
+        </p:nvPicPr>
+        <p:blipFill>
+          <a:blip r:embed="rId2"/>
+          <a:srcRect l="-28777" r="-28777"/>
+          <a:stretch>
+            <a:fillRect/>
+          </a:stretch>
+        </p:blipFill>
+        <p:spPr/>
+      </p:pic>
+    </p:spTree>
+    <p:extLst>
+      <p:ext uri="{BB962C8B-B14F-4D97-AF65-F5344CB8AC3E}">
+        <p14:creationId xmlns:p14="http://schemas.microsoft.com/office/powerpoint/2010/main" val="359167342"/>
+      </p:ext>
+    </p:extLst>
+  </p:cSld>
+  <p:clrMapOvr>
+    <a:masterClrMapping/>
+  </p:clrMapOvr>
+</p:sld>
+</file>
+
+<file path=ppt/slides/slide46.xml><?xml version="1.0" encoding="utf-8"?>
+<p:sld xmlns:a="http://schemas.openxmlformats.org/drawingml/2006/main" xmlns:r="http://schemas.openxmlformats.org/officeDocument/2006/relationships" xmlns:p="http://schemas.openxmlformats.org/presentationml/2006/main">
+  <p:cSld>
+    <p:spTree>
+      <p:nvGrpSpPr>
+        <p:cNvPr id="1" name=""/>
+        <p:cNvGrpSpPr/>
+        <p:nvPr/>
+      </p:nvGrpSpPr>
+      <p:grpSpPr>
+        <a:xfrm>
+          <a:off x="0" y="0"/>
+          <a:ext cx="0" cy="0"/>
+          <a:chOff x="0" y="0"/>
+          <a:chExt cx="0" cy="0"/>
+        </a:xfrm>
+      </p:grpSpPr>
+      <p:sp>
+        <p:nvSpPr>
+          <p:cNvPr id="2" name="Title 1"/>
+          <p:cNvSpPr>
+            <a:spLocks noGrp="1"/>
+          </p:cNvSpPr>
+          <p:nvPr>
+            <p:ph type="title"/>
+          </p:nvPr>
+        </p:nvSpPr>
+        <p:spPr/>
+        <p:txBody>
+          <a:bodyPr/>
+          <a:lstStyle/>
+          <a:p>
+            <a:r>
+              <a:rPr lang="en-US" dirty="0" smtClean="0"/>
               <a:t>Lab 5</a:t>
             </a:r>
             <a:endParaRPr lang="en-US" dirty="0"/>
           </a:p>
         </p:txBody>
       </p:sp>
-      <p:sp>
-        <p:nvSpPr>
-          <p:cNvPr id="3" name="Content Placeholder 2"/>
-          <p:cNvSpPr>
-            <a:spLocks noGrp="1"/>
-          </p:cNvSpPr>
+      <p:pic>
+        <p:nvPicPr>
+          <p:cNvPr id="4" name="Content Placeholder 3"/>
+          <p:cNvPicPr>
+            <a:picLocks noGrp="1" noChangeAspect="1"/>
+          </p:cNvPicPr>
           <p:nvPr>
             <p:ph idx="1"/>
           </p:nvPr>
-        </p:nvSpPr>
-        <p:spPr/>
-        <p:txBody>
-          <a:bodyPr/>
-          <a:lstStyle/>
-          <a:p>
-            <a:endParaRPr lang="en-US"/>
-          </a:p>
-        </p:txBody>
-      </p:sp>
+        </p:nvPicPr>
+        <p:blipFill>
+          <a:blip r:embed="rId2"/>
+          <a:srcRect l="-100103" r="-100103"/>
+          <a:stretch>
+            <a:fillRect/>
+          </a:stretch>
+        </p:blipFill>
+        <p:spPr/>
+      </p:pic>
     </p:spTree>
     <p:extLst>
       <p:ext uri="{BB962C8B-B14F-4D97-AF65-F5344CB8AC3E}">

</xml_diff>